<commit_message>
Prototypes met titels en aangepast paginatie onder datagrid
</commit_message>
<xml_diff>
--- a/RapporteringLaroni/PrototypesLaroniTravel.pptx
+++ b/RapporteringLaroni/PrototypesLaroniTravel.pptx
@@ -3491,10 +3491,10 @@
       </p:sp>
       <p:pic>
         <p:nvPicPr>
-          <p:cNvPr id="15" name="Tijdelijke aanduiding voor inhoud 14">
-            <a:extLst>
-              <a:ext uri="{FF2B5EF4-FFF2-40B4-BE49-F238E27FC236}">
-                <a16:creationId xmlns:a16="http://schemas.microsoft.com/office/drawing/2014/main" id="{6BD86DD9-CEDD-CBDF-079C-06FA625D62E7}"/>
+          <p:cNvPr id="10" name="Tijdelijke aanduiding voor inhoud 9">
+            <a:extLst>
+              <a:ext uri="{FF2B5EF4-FFF2-40B4-BE49-F238E27FC236}">
+                <a16:creationId xmlns:a16="http://schemas.microsoft.com/office/drawing/2014/main" id="{F4DE2C76-113A-714A-80C9-AD894DD7FFFE}"/>
               </a:ext>
             </a:extLst>
           </p:cNvPr>
@@ -3513,8 +3513,8 @@
         </p:blipFill>
         <p:spPr>
           <a:xfrm>
-            <a:off x="2636196" y="1825625"/>
-            <a:ext cx="6919608" cy="4351338"/>
+            <a:off x="2247513" y="1825625"/>
+            <a:ext cx="7696973" cy="4351338"/>
           </a:xfrm>
         </p:spPr>
       </p:pic>
@@ -4101,10 +4101,10 @@
       </p:sp>
       <p:pic>
         <p:nvPicPr>
-          <p:cNvPr id="6" name="Tijdelijke aanduiding voor inhoud 5">
-            <a:extLst>
-              <a:ext uri="{FF2B5EF4-FFF2-40B4-BE49-F238E27FC236}">
-                <a16:creationId xmlns:a16="http://schemas.microsoft.com/office/drawing/2014/main" id="{CA21B521-78A1-F988-2EEB-936B08F74947}"/>
+          <p:cNvPr id="9" name="Tijdelijke aanduiding voor inhoud 8">
+            <a:extLst>
+              <a:ext uri="{FF2B5EF4-FFF2-40B4-BE49-F238E27FC236}">
+                <a16:creationId xmlns:a16="http://schemas.microsoft.com/office/drawing/2014/main" id="{E89489F6-CDB2-05C1-1F3D-8F700D717A1A}"/>
               </a:ext>
             </a:extLst>
           </p:cNvPr>
@@ -4123,8 +4123,8 @@
         </p:blipFill>
         <p:spPr>
           <a:xfrm>
-            <a:off x="1825492" y="1825625"/>
-            <a:ext cx="8541015" cy="4351338"/>
+            <a:off x="1734334" y="1825625"/>
+            <a:ext cx="8723332" cy="4351338"/>
           </a:xfrm>
         </p:spPr>
       </p:pic>
@@ -4188,10 +4188,10 @@
       </p:sp>
       <p:pic>
         <p:nvPicPr>
-          <p:cNvPr id="6" name="Tijdelijke aanduiding voor inhoud 5">
-            <a:extLst>
-              <a:ext uri="{FF2B5EF4-FFF2-40B4-BE49-F238E27FC236}">
-                <a16:creationId xmlns:a16="http://schemas.microsoft.com/office/drawing/2014/main" id="{C2A7A5D4-1992-C9B8-4FEC-D095EF5F99B0}"/>
+          <p:cNvPr id="7" name="Tijdelijke aanduiding voor inhoud 6">
+            <a:extLst>
+              <a:ext uri="{FF2B5EF4-FFF2-40B4-BE49-F238E27FC236}">
+                <a16:creationId xmlns:a16="http://schemas.microsoft.com/office/drawing/2014/main" id="{71DCC441-CECB-5EA1-6AD7-E50100E8BD16}"/>
               </a:ext>
             </a:extLst>
           </p:cNvPr>
@@ -4210,8 +4210,8 @@
         </p:blipFill>
         <p:spPr>
           <a:xfrm>
-            <a:off x="1748072" y="1825625"/>
-            <a:ext cx="8695856" cy="4351338"/>
+            <a:off x="1805662" y="1825625"/>
+            <a:ext cx="8580675" cy="4351338"/>
           </a:xfrm>
         </p:spPr>
       </p:pic>
@@ -4277,10 +4277,10 @@
       </p:sp>
       <p:pic>
         <p:nvPicPr>
-          <p:cNvPr id="7" name="Tijdelijke aanduiding voor inhoud 6">
-            <a:extLst>
-              <a:ext uri="{FF2B5EF4-FFF2-40B4-BE49-F238E27FC236}">
-                <a16:creationId xmlns:a16="http://schemas.microsoft.com/office/drawing/2014/main" id="{9677512F-C742-0CB3-D495-9F7C5B76EABB}"/>
+          <p:cNvPr id="6" name="Tijdelijke aanduiding voor inhoud 5">
+            <a:extLst>
+              <a:ext uri="{FF2B5EF4-FFF2-40B4-BE49-F238E27FC236}">
+                <a16:creationId xmlns:a16="http://schemas.microsoft.com/office/drawing/2014/main" id="{580FAA7C-68AB-F140-F614-5943CC6B8691}"/>
               </a:ext>
             </a:extLst>
           </p:cNvPr>
@@ -4299,8 +4299,8 @@
         </p:blipFill>
         <p:spPr>
           <a:xfrm>
-            <a:off x="1741225" y="1825625"/>
-            <a:ext cx="8709550" cy="4351338"/>
+            <a:off x="1695770" y="1825625"/>
+            <a:ext cx="8800459" cy="4351338"/>
           </a:xfrm>
         </p:spPr>
       </p:pic>
@@ -4364,10 +4364,10 @@
       </p:sp>
       <p:pic>
         <p:nvPicPr>
-          <p:cNvPr id="6" name="Tijdelijke aanduiding voor inhoud 5">
-            <a:extLst>
-              <a:ext uri="{FF2B5EF4-FFF2-40B4-BE49-F238E27FC236}">
-                <a16:creationId xmlns:a16="http://schemas.microsoft.com/office/drawing/2014/main" id="{D6571B9B-482B-6A49-127C-93D83BC47826}"/>
+          <p:cNvPr id="7" name="Tijdelijke aanduiding voor inhoud 6">
+            <a:extLst>
+              <a:ext uri="{FF2B5EF4-FFF2-40B4-BE49-F238E27FC236}">
+                <a16:creationId xmlns:a16="http://schemas.microsoft.com/office/drawing/2014/main" id="{424EB2DE-0D81-5B16-00D5-973272B2395A}"/>
               </a:ext>
             </a:extLst>
           </p:cNvPr>
@@ -4386,8 +4386,8 @@
         </p:blipFill>
         <p:spPr>
           <a:xfrm>
-            <a:off x="1829782" y="1825625"/>
-            <a:ext cx="8532435" cy="4351338"/>
+            <a:off x="1836162" y="1825625"/>
+            <a:ext cx="8519675" cy="4351338"/>
           </a:xfrm>
         </p:spPr>
       </p:pic>

</xml_diff>